<commit_message>
#1 Modify: week_4 ppt
</commit_message>
<xml_diff>
--- a/week_4/Week_4.pptx
+++ b/week_4/Week_4.pptx
@@ -3367,13 +3367,12 @@
             </a:r>
             <a:r>
               <a:rPr lang="en-US" altLang="ko-KR" sz="5400" dirty="0"/>
-              <a:t>3</a:t>
-            </a:r>
-            <a:r>
-              <a:rPr lang="ko-KR" altLang="en-US" sz="5400" dirty="0" smtClean="0"/>
+              <a:t>4</a:t>
+            </a:r>
+            <a:r>
+              <a:rPr lang="ko-KR" altLang="en-US" sz="5400" dirty="0"/>
               <a:t>주차</a:t>
             </a:r>
-            <a:endParaRPr lang="ko-KR" altLang="en-US" sz="5400" dirty="0"/>
           </a:p>
         </p:txBody>
       </p:sp>
@@ -3436,7 +3435,7 @@
           <a:lstStyle/>
           <a:p>
             <a:r>
-              <a:rPr lang="en-US" altLang="ko-KR" sz="3600" dirty="0" err="1" smtClean="0"/>
+              <a:rPr lang="en-US" altLang="ko-KR" sz="3600" dirty="0" err="1"/>
               <a:t>BoJ_2156</a:t>
             </a:r>
             <a:endParaRPr lang="ko-KR" altLang="en-US" sz="3600" dirty="0"/>
@@ -3526,7 +3525,7 @@
           <a:lstStyle/>
           <a:p>
             <a:r>
-              <a:rPr lang="en-US" altLang="ko-KR" sz="3600" dirty="0" err="1" smtClean="0"/>
+              <a:rPr lang="en-US" altLang="ko-KR" sz="3600" dirty="0" err="1"/>
               <a:t>BoJ_6118</a:t>
             </a:r>
             <a:endParaRPr lang="ko-KR" altLang="en-US" sz="3600" dirty="0"/>
@@ -3616,7 +3615,7 @@
           <a:lstStyle/>
           <a:p>
             <a:r>
-              <a:rPr lang="en-US" altLang="ko-KR" sz="3600" dirty="0" err="1" smtClean="0"/>
+              <a:rPr lang="en-US" altLang="ko-KR" sz="3600" dirty="0" err="1"/>
               <a:t>BoJ_8972</a:t>
             </a:r>
             <a:endParaRPr lang="ko-KR" altLang="en-US" sz="3600" dirty="0"/>
@@ -3706,7 +3705,7 @@
           <a:lstStyle/>
           <a:p>
             <a:r>
-              <a:rPr lang="en-US" altLang="ko-KR" sz="3600" dirty="0" err="1" smtClean="0"/>
+              <a:rPr lang="en-US" altLang="ko-KR" sz="3600" dirty="0" err="1"/>
               <a:t>BoJ_3257</a:t>
             </a:r>
             <a:endParaRPr lang="ko-KR" altLang="en-US" sz="3600" dirty="0"/>
@@ -3796,7 +3795,7 @@
           <a:lstStyle/>
           <a:p>
             <a:r>
-              <a:rPr lang="en-US" altLang="ko-KR" sz="3600" dirty="0" err="1" smtClean="0"/>
+              <a:rPr lang="en-US" altLang="ko-KR" sz="3600" dirty="0" err="1"/>
               <a:t>BoJ_3257</a:t>
             </a:r>
             <a:endParaRPr lang="ko-KR" altLang="en-US" sz="3600" dirty="0"/>
@@ -3908,7 +3907,7 @@
           <a:lstStyle/>
           <a:p>
             <a:r>
-              <a:rPr lang="en-US" altLang="ko-KR" sz="3600" dirty="0" err="1" smtClean="0"/>
+              <a:rPr lang="en-US" altLang="ko-KR" sz="3600" dirty="0" err="1"/>
               <a:t>BoJ_3257</a:t>
             </a:r>
             <a:endParaRPr lang="ko-KR" altLang="en-US" sz="3600" dirty="0"/>
@@ -3998,7 +3997,7 @@
           <a:lstStyle/>
           <a:p>
             <a:r>
-              <a:rPr lang="en-US" altLang="ko-KR" sz="3600" dirty="0" err="1" smtClean="0"/>
+              <a:rPr lang="en-US" altLang="ko-KR" sz="3600" dirty="0" err="1"/>
               <a:t>BoJ_3257</a:t>
             </a:r>
             <a:endParaRPr lang="ko-KR" altLang="en-US" sz="3600" dirty="0"/>

</xml_diff>